<commit_message>
Added PieChart for Version Control
</commit_message>
<xml_diff>
--- a/Stack-overflow-2018-data-analysis.pptx
+++ b/Stack-overflow-2018-data-analysis.pptx
@@ -5,7 +5,7 @@
     <p:sldMasterId id="2147483648" r:id="rId1"/>
   </p:sldMasterIdLst>
   <p:notesMasterIdLst>
-    <p:notesMasterId r:id="rId32"/>
+    <p:notesMasterId r:id="rId34"/>
   </p:notesMasterIdLst>
   <p:sldIdLst>
     <p:sldId id="256" r:id="rId2"/>
@@ -14,18 +14,18 @@
     <p:sldId id="283" r:id="rId5"/>
     <p:sldId id="284" r:id="rId6"/>
     <p:sldId id="267" r:id="rId7"/>
-    <p:sldId id="270" r:id="rId8"/>
-    <p:sldId id="268" r:id="rId9"/>
-    <p:sldId id="269" r:id="rId10"/>
-    <p:sldId id="271" r:id="rId11"/>
-    <p:sldId id="272" r:id="rId12"/>
-    <p:sldId id="273" r:id="rId13"/>
-    <p:sldId id="276" r:id="rId14"/>
-    <p:sldId id="274" r:id="rId15"/>
-    <p:sldId id="277" r:id="rId16"/>
-    <p:sldId id="278" r:id="rId17"/>
-    <p:sldId id="279" r:id="rId18"/>
-    <p:sldId id="280" r:id="rId19"/>
+    <p:sldId id="268" r:id="rId8"/>
+    <p:sldId id="269" r:id="rId9"/>
+    <p:sldId id="271" r:id="rId10"/>
+    <p:sldId id="272" r:id="rId11"/>
+    <p:sldId id="273" r:id="rId12"/>
+    <p:sldId id="276" r:id="rId13"/>
+    <p:sldId id="274" r:id="rId14"/>
+    <p:sldId id="277" r:id="rId15"/>
+    <p:sldId id="278" r:id="rId16"/>
+    <p:sldId id="279" r:id="rId17"/>
+    <p:sldId id="280" r:id="rId18"/>
+    <p:sldId id="286" r:id="rId19"/>
     <p:sldId id="281" r:id="rId20"/>
     <p:sldId id="275" r:id="rId21"/>
     <p:sldId id="257" r:id="rId22"/>
@@ -37,7 +37,9 @@
     <p:sldId id="263" r:id="rId28"/>
     <p:sldId id="264" r:id="rId29"/>
     <p:sldId id="265" r:id="rId30"/>
-    <p:sldId id="285" r:id="rId31"/>
+    <p:sldId id="287" r:id="rId31"/>
+    <p:sldId id="285" r:id="rId32"/>
+    <p:sldId id="288" r:id="rId33"/>
   </p:sldIdLst>
   <p:sldSz cx="12192000" cy="6858000"/>
   <p:notesSz cx="6858000" cy="9144000"/>
@@ -4191,7 +4193,7 @@
           <a:p>
             <a:fld id="{E87BFCAF-6976-A943-860B-8510B1D7E8B7}" type="slidenum">
               <a:rPr lang="en-US" smtClean="0"/>
-              <a:t>17</a:t>
+              <a:t>16</a:t>
             </a:fld>
             <a:endParaRPr lang="en-US"/>
           </a:p>
@@ -7454,93 +7456,6 @@
           <p:cNvPr id="2" name="Title 1">
             <a:extLst>
               <a:ext uri="{FF2B5EF4-FFF2-40B4-BE49-F238E27FC236}">
-                <a16:creationId xmlns:a16="http://schemas.microsoft.com/office/drawing/2014/main" id="{148D1DF6-1C1F-0A49-8DFF-1CFD9031BCB6}"/>
-              </a:ext>
-            </a:extLst>
-          </p:cNvPr>
-          <p:cNvSpPr>
-            <a:spLocks noGrp="1"/>
-          </p:cNvSpPr>
-          <p:nvPr>
-            <p:ph type="title"/>
-          </p:nvPr>
-        </p:nvSpPr>
-        <p:spPr/>
-        <p:txBody>
-          <a:bodyPr/>
-          <a:lstStyle/>
-          <a:p>
-            <a:r>
-              <a:rPr lang="en-US" dirty="0"/>
-              <a:t>Developer Roles</a:t>
-            </a:r>
-          </a:p>
-        </p:txBody>
-      </p:sp>
-      <p:pic>
-        <p:nvPicPr>
-          <p:cNvPr id="5" name="Content Placeholder 4">
-            <a:extLst>
-              <a:ext uri="{FF2B5EF4-FFF2-40B4-BE49-F238E27FC236}">
-                <a16:creationId xmlns:a16="http://schemas.microsoft.com/office/drawing/2014/main" id="{0026115F-D365-0342-853A-81DD3E514840}"/>
-              </a:ext>
-            </a:extLst>
-          </p:cNvPr>
-          <p:cNvPicPr>
-            <a:picLocks noGrp="1" noChangeAspect="1"/>
-          </p:cNvPicPr>
-          <p:nvPr>
-            <p:ph idx="1"/>
-          </p:nvPr>
-        </p:nvPicPr>
-        <p:blipFill>
-          <a:blip r:embed="rId2"/>
-          <a:stretch>
-            <a:fillRect/>
-          </a:stretch>
-        </p:blipFill>
-        <p:spPr>
-          <a:xfrm>
-            <a:off x="2209264" y="1048871"/>
-            <a:ext cx="7773472" cy="5307012"/>
-          </a:xfrm>
-        </p:spPr>
-      </p:pic>
-    </p:spTree>
-    <p:extLst>
-      <p:ext uri="{BB962C8B-B14F-4D97-AF65-F5344CB8AC3E}">
-        <p14:creationId xmlns:p14="http://schemas.microsoft.com/office/powerpoint/2010/main" val="2785525551"/>
-      </p:ext>
-    </p:extLst>
-  </p:cSld>
-  <p:clrMapOvr>
-    <a:masterClrMapping/>
-  </p:clrMapOvr>
-</p:sld>
-</file>
-
-<file path=ppt/slides/slide11.xml><?xml version="1.0" encoding="utf-8"?>
-<p:sld xmlns:a="http://schemas.openxmlformats.org/drawingml/2006/main" xmlns:r="http://schemas.openxmlformats.org/officeDocument/2006/relationships" xmlns:p="http://schemas.openxmlformats.org/presentationml/2006/main">
-  <p:cSld>
-    <p:spTree>
-      <p:nvGrpSpPr>
-        <p:cNvPr id="1" name=""/>
-        <p:cNvGrpSpPr/>
-        <p:nvPr/>
-      </p:nvGrpSpPr>
-      <p:grpSpPr>
-        <a:xfrm>
-          <a:off x="0" y="0"/>
-          <a:ext cx="0" cy="0"/>
-          <a:chOff x="0" y="0"/>
-          <a:chExt cx="0" cy="0"/>
-        </a:xfrm>
-      </p:grpSpPr>
-      <p:sp>
-        <p:nvSpPr>
-          <p:cNvPr id="2" name="Title 1">
-            <a:extLst>
-              <a:ext uri="{FF2B5EF4-FFF2-40B4-BE49-F238E27FC236}">
                 <a16:creationId xmlns:a16="http://schemas.microsoft.com/office/drawing/2014/main" id="{E636921F-89AE-3B47-8737-F0AB2487385F}"/>
               </a:ext>
             </a:extLst>
@@ -7666,7 +7581,7 @@
 </p:sld>
 </file>
 
-<file path=ppt/slides/slide12.xml><?xml version="1.0" encoding="utf-8"?>
+<file path=ppt/slides/slide11.xml><?xml version="1.0" encoding="utf-8"?>
 <p:sld xmlns:a="http://schemas.openxmlformats.org/drawingml/2006/main" xmlns:r="http://schemas.openxmlformats.org/officeDocument/2006/relationships" xmlns:p="http://schemas.openxmlformats.org/presentationml/2006/main">
   <p:cSld>
     <p:spTree>
@@ -7753,6 +7668,89 @@
 </p:sld>
 </file>
 
+<file path=ppt/slides/slide12.xml><?xml version="1.0" encoding="utf-8"?>
+<p:sld xmlns:a="http://schemas.openxmlformats.org/drawingml/2006/main" xmlns:r="http://schemas.openxmlformats.org/officeDocument/2006/relationships" xmlns:p="http://schemas.openxmlformats.org/presentationml/2006/main">
+  <p:cSld>
+    <p:spTree>
+      <p:nvGrpSpPr>
+        <p:cNvPr id="1" name=""/>
+        <p:cNvGrpSpPr/>
+        <p:nvPr/>
+      </p:nvGrpSpPr>
+      <p:grpSpPr>
+        <a:xfrm>
+          <a:off x="0" y="0"/>
+          <a:ext cx="0" cy="0"/>
+          <a:chOff x="0" y="0"/>
+          <a:chExt cx="0" cy="0"/>
+        </a:xfrm>
+      </p:grpSpPr>
+      <p:sp>
+        <p:nvSpPr>
+          <p:cNvPr id="2" name="Title 1">
+            <a:extLst>
+              <a:ext uri="{FF2B5EF4-FFF2-40B4-BE49-F238E27FC236}">
+                <a16:creationId xmlns:a16="http://schemas.microsoft.com/office/drawing/2014/main" id="{416E13EB-452E-0F47-B58E-86C45EB16931}"/>
+              </a:ext>
+            </a:extLst>
+          </p:cNvPr>
+          <p:cNvSpPr>
+            <a:spLocks noGrp="1"/>
+          </p:cNvSpPr>
+          <p:nvPr>
+            <p:ph type="title"/>
+          </p:nvPr>
+        </p:nvSpPr>
+        <p:spPr/>
+        <p:txBody>
+          <a:bodyPr/>
+          <a:lstStyle/>
+          <a:p>
+            <a:r>
+              <a:rPr lang="en-US" dirty="0"/>
+              <a:t>Demographics: Education</a:t>
+            </a:r>
+          </a:p>
+        </p:txBody>
+      </p:sp>
+      <p:sp>
+        <p:nvSpPr>
+          <p:cNvPr id="3" name="Content Placeholder 2">
+            <a:extLst>
+              <a:ext uri="{FF2B5EF4-FFF2-40B4-BE49-F238E27FC236}">
+                <a16:creationId xmlns:a16="http://schemas.microsoft.com/office/drawing/2014/main" id="{F4BD516B-16BA-6C4E-A077-8CF0F5714B7D}"/>
+              </a:ext>
+            </a:extLst>
+          </p:cNvPr>
+          <p:cNvSpPr>
+            <a:spLocks noGrp="1"/>
+          </p:cNvSpPr>
+          <p:nvPr>
+            <p:ph idx="1"/>
+          </p:nvPr>
+        </p:nvSpPr>
+        <p:spPr/>
+        <p:txBody>
+          <a:bodyPr/>
+          <a:lstStyle/>
+          <a:p>
+            <a:endParaRPr lang="en-US"/>
+          </a:p>
+        </p:txBody>
+      </p:sp>
+    </p:spTree>
+    <p:extLst>
+      <p:ext uri="{BB962C8B-B14F-4D97-AF65-F5344CB8AC3E}">
+        <p14:creationId xmlns:p14="http://schemas.microsoft.com/office/powerpoint/2010/main" val="523151897"/>
+      </p:ext>
+    </p:extLst>
+  </p:cSld>
+  <p:clrMapOvr>
+    <a:masterClrMapping/>
+  </p:clrMapOvr>
+</p:sld>
+</file>
+
 <file path=ppt/slides/slide13.xml><?xml version="1.0" encoding="utf-8"?>
 <p:sld xmlns:a="http://schemas.openxmlformats.org/drawingml/2006/main" xmlns:r="http://schemas.openxmlformats.org/officeDocument/2006/relationships" xmlns:p="http://schemas.openxmlformats.org/presentationml/2006/main">
   <p:cSld>
@@ -7772,89 +7770,6 @@
       </p:grpSpPr>
       <p:sp>
         <p:nvSpPr>
-          <p:cNvPr id="2" name="Title 1">
-            <a:extLst>
-              <a:ext uri="{FF2B5EF4-FFF2-40B4-BE49-F238E27FC236}">
-                <a16:creationId xmlns:a16="http://schemas.microsoft.com/office/drawing/2014/main" id="{416E13EB-452E-0F47-B58E-86C45EB16931}"/>
-              </a:ext>
-            </a:extLst>
-          </p:cNvPr>
-          <p:cNvSpPr>
-            <a:spLocks noGrp="1"/>
-          </p:cNvSpPr>
-          <p:nvPr>
-            <p:ph type="title"/>
-          </p:nvPr>
-        </p:nvSpPr>
-        <p:spPr/>
-        <p:txBody>
-          <a:bodyPr/>
-          <a:lstStyle/>
-          <a:p>
-            <a:r>
-              <a:rPr lang="en-US" dirty="0"/>
-              <a:t>Demographics: Education</a:t>
-            </a:r>
-          </a:p>
-        </p:txBody>
-      </p:sp>
-      <p:sp>
-        <p:nvSpPr>
-          <p:cNvPr id="3" name="Content Placeholder 2">
-            <a:extLst>
-              <a:ext uri="{FF2B5EF4-FFF2-40B4-BE49-F238E27FC236}">
-                <a16:creationId xmlns:a16="http://schemas.microsoft.com/office/drawing/2014/main" id="{F4BD516B-16BA-6C4E-A077-8CF0F5714B7D}"/>
-              </a:ext>
-            </a:extLst>
-          </p:cNvPr>
-          <p:cNvSpPr>
-            <a:spLocks noGrp="1"/>
-          </p:cNvSpPr>
-          <p:nvPr>
-            <p:ph idx="1"/>
-          </p:nvPr>
-        </p:nvSpPr>
-        <p:spPr/>
-        <p:txBody>
-          <a:bodyPr/>
-          <a:lstStyle/>
-          <a:p>
-            <a:endParaRPr lang="en-US"/>
-          </a:p>
-        </p:txBody>
-      </p:sp>
-    </p:spTree>
-    <p:extLst>
-      <p:ext uri="{BB962C8B-B14F-4D97-AF65-F5344CB8AC3E}">
-        <p14:creationId xmlns:p14="http://schemas.microsoft.com/office/powerpoint/2010/main" val="523151897"/>
-      </p:ext>
-    </p:extLst>
-  </p:cSld>
-  <p:clrMapOvr>
-    <a:masterClrMapping/>
-  </p:clrMapOvr>
-</p:sld>
-</file>
-
-<file path=ppt/slides/slide14.xml><?xml version="1.0" encoding="utf-8"?>
-<p:sld xmlns:a="http://schemas.openxmlformats.org/drawingml/2006/main" xmlns:r="http://schemas.openxmlformats.org/officeDocument/2006/relationships" xmlns:p="http://schemas.openxmlformats.org/presentationml/2006/main">
-  <p:cSld>
-    <p:spTree>
-      <p:nvGrpSpPr>
-        <p:cNvPr id="1" name=""/>
-        <p:cNvGrpSpPr/>
-        <p:nvPr/>
-      </p:nvGrpSpPr>
-      <p:grpSpPr>
-        <a:xfrm>
-          <a:off x="0" y="0"/>
-          <a:ext cx="0" cy="0"/>
-          <a:chOff x="0" y="0"/>
-          <a:chExt cx="0" cy="0"/>
-        </a:xfrm>
-      </p:grpSpPr>
-      <p:sp>
-        <p:nvSpPr>
           <p:cNvPr id="4" name="Title 3">
             <a:extLst>
               <a:ext uri="{FF2B5EF4-FFF2-40B4-BE49-F238E27FC236}">
@@ -7894,7 +7809,7 @@
 </p:sld>
 </file>
 
-<file path=ppt/slides/slide15.xml><?xml version="1.0" encoding="utf-8"?>
+<file path=ppt/slides/slide14.xml><?xml version="1.0" encoding="utf-8"?>
 <p:sld xmlns:a="http://schemas.openxmlformats.org/drawingml/2006/main" xmlns:r="http://schemas.openxmlformats.org/officeDocument/2006/relationships" xmlns:p="http://schemas.openxmlformats.org/presentationml/2006/main">
   <p:cSld>
     <p:spTree>
@@ -7981,7 +7896,7 @@
 </p:sld>
 </file>
 
-<file path=ppt/slides/slide16.xml><?xml version="1.0" encoding="utf-8"?>
+<file path=ppt/slides/slide15.xml><?xml version="1.0" encoding="utf-8"?>
 <p:sld xmlns:a="http://schemas.openxmlformats.org/drawingml/2006/main" xmlns:r="http://schemas.openxmlformats.org/officeDocument/2006/relationships" xmlns:p="http://schemas.openxmlformats.org/presentationml/2006/main">
   <p:cSld>
     <p:spTree>
@@ -8068,7 +7983,7 @@
 </p:sld>
 </file>
 
-<file path=ppt/slides/slide17.xml><?xml version="1.0" encoding="utf-8"?>
+<file path=ppt/slides/slide16.xml><?xml version="1.0" encoding="utf-8"?>
 <p:sld xmlns:a="http://schemas.openxmlformats.org/drawingml/2006/main" xmlns:r="http://schemas.openxmlformats.org/officeDocument/2006/relationships" xmlns:p="http://schemas.openxmlformats.org/presentationml/2006/main">
   <p:cSld>
     <p:spTree>
@@ -8108,7 +8023,7 @@
           <a:p>
             <a:r>
               <a:rPr lang="en-US" dirty="0"/>
-              <a:t>Database</a:t>
+              <a:t>Top 10 Database</a:t>
             </a:r>
           </a:p>
         </p:txBody>
@@ -8155,6 +8070,93 @@
 </p:sld>
 </file>
 
+<file path=ppt/slides/slide17.xml><?xml version="1.0" encoding="utf-8"?>
+<p:sld xmlns:a="http://schemas.openxmlformats.org/drawingml/2006/main" xmlns:r="http://schemas.openxmlformats.org/officeDocument/2006/relationships" xmlns:p="http://schemas.openxmlformats.org/presentationml/2006/main">
+  <p:cSld>
+    <p:spTree>
+      <p:nvGrpSpPr>
+        <p:cNvPr id="1" name=""/>
+        <p:cNvGrpSpPr/>
+        <p:nvPr/>
+      </p:nvGrpSpPr>
+      <p:grpSpPr>
+        <a:xfrm>
+          <a:off x="0" y="0"/>
+          <a:ext cx="0" cy="0"/>
+          <a:chOff x="0" y="0"/>
+          <a:chExt cx="0" cy="0"/>
+        </a:xfrm>
+      </p:grpSpPr>
+      <p:sp>
+        <p:nvSpPr>
+          <p:cNvPr id="3" name="Title 2">
+            <a:extLst>
+              <a:ext uri="{FF2B5EF4-FFF2-40B4-BE49-F238E27FC236}">
+                <a16:creationId xmlns:a16="http://schemas.microsoft.com/office/drawing/2014/main" id="{ACFD7319-1EA8-2C4C-A76F-95BC5E187D01}"/>
+              </a:ext>
+            </a:extLst>
+          </p:cNvPr>
+          <p:cNvSpPr>
+            <a:spLocks noGrp="1"/>
+          </p:cNvSpPr>
+          <p:nvPr>
+            <p:ph type="title"/>
+          </p:nvPr>
+        </p:nvSpPr>
+        <p:spPr/>
+        <p:txBody>
+          <a:bodyPr/>
+          <a:lstStyle/>
+          <a:p>
+            <a:r>
+              <a:rPr lang="en-US" dirty="0"/>
+              <a:t>Version Control &amp; Commit</a:t>
+            </a:r>
+          </a:p>
+        </p:txBody>
+      </p:sp>
+      <p:pic>
+        <p:nvPicPr>
+          <p:cNvPr id="6" name="Content Placeholder 5">
+            <a:extLst>
+              <a:ext uri="{FF2B5EF4-FFF2-40B4-BE49-F238E27FC236}">
+                <a16:creationId xmlns:a16="http://schemas.microsoft.com/office/drawing/2014/main" id="{69D05D0D-7579-6E43-BC36-84633F4069F5}"/>
+              </a:ext>
+            </a:extLst>
+          </p:cNvPr>
+          <p:cNvPicPr>
+            <a:picLocks noGrp="1" noChangeAspect="1"/>
+          </p:cNvPicPr>
+          <p:nvPr>
+            <p:ph idx="1"/>
+          </p:nvPr>
+        </p:nvPicPr>
+        <p:blipFill>
+          <a:blip r:embed="rId2"/>
+          <a:stretch>
+            <a:fillRect/>
+          </a:stretch>
+        </p:blipFill>
+        <p:spPr>
+          <a:xfrm>
+            <a:off x="1919664" y="1148884"/>
+            <a:ext cx="8552697" cy="5307012"/>
+          </a:xfrm>
+        </p:spPr>
+      </p:pic>
+    </p:spTree>
+    <p:extLst>
+      <p:ext uri="{BB962C8B-B14F-4D97-AF65-F5344CB8AC3E}">
+        <p14:creationId xmlns:p14="http://schemas.microsoft.com/office/powerpoint/2010/main" val="3787454949"/>
+      </p:ext>
+    </p:extLst>
+  </p:cSld>
+  <p:clrMapOvr>
+    <a:masterClrMapping/>
+  </p:clrMapOvr>
+</p:sld>
+</file>
+
 <file path=ppt/slides/slide18.xml><?xml version="1.0" encoding="utf-8"?>
 <p:sld xmlns:a="http://schemas.openxmlformats.org/drawingml/2006/main" xmlns:r="http://schemas.openxmlformats.org/officeDocument/2006/relationships" xmlns:p="http://schemas.openxmlformats.org/presentationml/2006/main">
   <p:cSld>
@@ -8195,7 +8197,7 @@
           <a:p>
             <a:r>
               <a:rPr lang="en-US" dirty="0"/>
-              <a:t>Version Control &amp; Commit</a:t>
+              <a:t>Commit Frequency</a:t>
             </a:r>
           </a:p>
         </p:txBody>
@@ -8205,7 +8207,7 @@
           <p:cNvPr id="7" name="Content Placeholder 6">
             <a:extLst>
               <a:ext uri="{FF2B5EF4-FFF2-40B4-BE49-F238E27FC236}">
-                <a16:creationId xmlns:a16="http://schemas.microsoft.com/office/drawing/2014/main" id="{8DAC47D6-EB27-9244-B94F-A2872B1B8F2A}"/>
+                <a16:creationId xmlns:a16="http://schemas.microsoft.com/office/drawing/2014/main" id="{30C43D10-C9F5-AC4F-9AE2-758DCDD00B9B}"/>
               </a:ext>
             </a:extLst>
           </p:cNvPr>
@@ -8224,45 +8226,15 @@
         </p:blipFill>
         <p:spPr>
           <a:xfrm>
-            <a:off x="71717" y="1748117"/>
-            <a:ext cx="6024283" cy="4383741"/>
+            <a:off x="2185808" y="1049338"/>
+            <a:ext cx="8629830" cy="5307012"/>
           </a:xfrm>
-        </p:spPr>
-      </p:pic>
-      <p:pic>
-        <p:nvPicPr>
-          <p:cNvPr id="9" name="Picture 8">
-            <a:extLst>
-              <a:ext uri="{FF2B5EF4-FFF2-40B4-BE49-F238E27FC236}">
-                <a16:creationId xmlns:a16="http://schemas.microsoft.com/office/drawing/2014/main" id="{EFFE8AF7-3679-4145-AE72-D0202CDCBBE6}"/>
-              </a:ext>
-            </a:extLst>
-          </p:cNvPr>
-          <p:cNvPicPr>
-            <a:picLocks noChangeAspect="1"/>
-          </p:cNvPicPr>
-          <p:nvPr/>
-        </p:nvPicPr>
-        <p:blipFill>
-          <a:blip r:embed="rId3"/>
-          <a:stretch>
-            <a:fillRect/>
-          </a:stretch>
-        </p:blipFill>
-        <p:spPr>
-          <a:xfrm>
-            <a:off x="6024282" y="1939881"/>
-            <a:ext cx="6167718" cy="4000211"/>
-          </a:xfrm>
-          <a:prstGeom prst="rect">
-            <a:avLst/>
-          </a:prstGeom>
         </p:spPr>
       </p:pic>
     </p:spTree>
     <p:extLst>
       <p:ext uri="{BB962C8B-B14F-4D97-AF65-F5344CB8AC3E}">
-        <p14:creationId xmlns:p14="http://schemas.microsoft.com/office/powerpoint/2010/main" val="3787454949"/>
+        <p14:creationId xmlns:p14="http://schemas.microsoft.com/office/powerpoint/2010/main" val="1658233260"/>
       </p:ext>
     </p:extLst>
   </p:cSld>
@@ -9664,6 +9636,98 @@
           <p:cNvPr id="2" name="Title 1">
             <a:extLst>
               <a:ext uri="{FF2B5EF4-FFF2-40B4-BE49-F238E27FC236}">
+                <a16:creationId xmlns:a16="http://schemas.microsoft.com/office/drawing/2014/main" id="{6522A906-BB28-CD4F-BFB1-4141D68BBD8B}"/>
+              </a:ext>
+            </a:extLst>
+          </p:cNvPr>
+          <p:cNvSpPr>
+            <a:spLocks noGrp="1"/>
+          </p:cNvSpPr>
+          <p:nvPr>
+            <p:ph type="title"/>
+          </p:nvPr>
+        </p:nvSpPr>
+        <p:spPr>
+          <a:xfrm>
+            <a:off x="838200" y="22225"/>
+            <a:ext cx="10515600" cy="1325563"/>
+          </a:xfrm>
+        </p:spPr>
+        <p:txBody>
+          <a:bodyPr/>
+          <a:lstStyle/>
+          <a:p>
+            <a:r>
+              <a:rPr lang="en-US" dirty="0"/>
+              <a:t>Top 10 Language by Salary (US)</a:t>
+            </a:r>
+          </a:p>
+        </p:txBody>
+      </p:sp>
+      <p:pic>
+        <p:nvPicPr>
+          <p:cNvPr id="7" name="Content Placeholder 6">
+            <a:extLst>
+              <a:ext uri="{FF2B5EF4-FFF2-40B4-BE49-F238E27FC236}">
+                <a16:creationId xmlns:a16="http://schemas.microsoft.com/office/drawing/2014/main" id="{06E5EEA5-E3FC-7A4D-BC95-1733705175A3}"/>
+              </a:ext>
+            </a:extLst>
+          </p:cNvPr>
+          <p:cNvPicPr>
+            <a:picLocks noGrp="1" noChangeAspect="1"/>
+          </p:cNvPicPr>
+          <p:nvPr>
+            <p:ph idx="1"/>
+          </p:nvPr>
+        </p:nvPicPr>
+        <p:blipFill>
+          <a:blip r:embed="rId2"/>
+          <a:stretch>
+            <a:fillRect/>
+          </a:stretch>
+        </p:blipFill>
+        <p:spPr>
+          <a:xfrm>
+            <a:off x="838200" y="1823216"/>
+            <a:ext cx="10515600" cy="3759255"/>
+          </a:xfrm>
+        </p:spPr>
+      </p:pic>
+    </p:spTree>
+    <p:extLst>
+      <p:ext uri="{BB962C8B-B14F-4D97-AF65-F5344CB8AC3E}">
+        <p14:creationId xmlns:p14="http://schemas.microsoft.com/office/powerpoint/2010/main" val="877039281"/>
+      </p:ext>
+    </p:extLst>
+  </p:cSld>
+  <p:clrMapOvr>
+    <a:masterClrMapping/>
+  </p:clrMapOvr>
+</p:sld>
+</file>
+
+<file path=ppt/slides/slide31.xml><?xml version="1.0" encoding="utf-8"?>
+<p:sld xmlns:a="http://schemas.openxmlformats.org/drawingml/2006/main" xmlns:r="http://schemas.openxmlformats.org/officeDocument/2006/relationships" xmlns:p="http://schemas.openxmlformats.org/presentationml/2006/main">
+  <p:cSld>
+    <p:spTree>
+      <p:nvGrpSpPr>
+        <p:cNvPr id="1" name=""/>
+        <p:cNvGrpSpPr/>
+        <p:nvPr/>
+      </p:nvGrpSpPr>
+      <p:grpSpPr>
+        <a:xfrm>
+          <a:off x="0" y="0"/>
+          <a:ext cx="0" cy="0"/>
+          <a:chOff x="0" y="0"/>
+          <a:chExt cx="0" cy="0"/>
+        </a:xfrm>
+      </p:grpSpPr>
+      <p:sp>
+        <p:nvSpPr>
+          <p:cNvPr id="2" name="Title 1">
+            <a:extLst>
+              <a:ext uri="{FF2B5EF4-FFF2-40B4-BE49-F238E27FC236}">
                 <a16:creationId xmlns:a16="http://schemas.microsoft.com/office/drawing/2014/main" id="{A561B959-A75C-D141-93BB-141161E6A7B4}"/>
               </a:ext>
             </a:extLst>
@@ -9788,6 +9852,76 @@
     <p:extLst>
       <p:ext uri="{BB962C8B-B14F-4D97-AF65-F5344CB8AC3E}">
         <p14:creationId xmlns:p14="http://schemas.microsoft.com/office/powerpoint/2010/main" val="1646545275"/>
+      </p:ext>
+    </p:extLst>
+  </p:cSld>
+  <p:clrMapOvr>
+    <a:masterClrMapping/>
+  </p:clrMapOvr>
+</p:sld>
+</file>
+
+<file path=ppt/slides/slide32.xml><?xml version="1.0" encoding="utf-8"?>
+<p:sld xmlns:a="http://schemas.openxmlformats.org/drawingml/2006/main" xmlns:r="http://schemas.openxmlformats.org/officeDocument/2006/relationships" xmlns:p="http://schemas.openxmlformats.org/presentationml/2006/main">
+  <p:cSld>
+    <p:spTree>
+      <p:nvGrpSpPr>
+        <p:cNvPr id="1" name=""/>
+        <p:cNvGrpSpPr/>
+        <p:nvPr/>
+      </p:nvGrpSpPr>
+      <p:grpSpPr>
+        <a:xfrm>
+          <a:off x="0" y="0"/>
+          <a:ext cx="0" cy="0"/>
+          <a:chOff x="0" y="0"/>
+          <a:chExt cx="0" cy="0"/>
+        </a:xfrm>
+      </p:grpSpPr>
+      <p:sp>
+        <p:nvSpPr>
+          <p:cNvPr id="4" name="Title 3">
+            <a:extLst>
+              <a:ext uri="{FF2B5EF4-FFF2-40B4-BE49-F238E27FC236}">
+                <a16:creationId xmlns:a16="http://schemas.microsoft.com/office/drawing/2014/main" id="{97DBC1E6-83A5-4F4F-893B-A6574D53270D}"/>
+              </a:ext>
+            </a:extLst>
+          </p:cNvPr>
+          <p:cNvSpPr>
+            <a:spLocks noGrp="1"/>
+          </p:cNvSpPr>
+          <p:nvPr>
+            <p:ph type="title"/>
+          </p:nvPr>
+        </p:nvSpPr>
+        <p:spPr/>
+        <p:txBody>
+          <a:bodyPr>
+            <a:normAutofit fontScale="90000"/>
+          </a:bodyPr>
+          <a:lstStyle/>
+          <a:p>
+            <a:r>
+              <a:rPr lang="en-US" dirty="0"/>
+              <a:t>Thank you!</a:t>
+            </a:r>
+            <a:br>
+              <a:rPr lang="en-US" dirty="0"/>
+            </a:br>
+            <a:br>
+              <a:rPr lang="en-US" dirty="0"/>
+            </a:br>
+            <a:r>
+              <a:rPr lang="en-US" dirty="0"/>
+              <a:t>Q &amp; A?</a:t>
+            </a:r>
+          </a:p>
+        </p:txBody>
+      </p:sp>
+    </p:spTree>
+    <p:extLst>
+      <p:ext uri="{BB962C8B-B14F-4D97-AF65-F5344CB8AC3E}">
+        <p14:creationId xmlns:p14="http://schemas.microsoft.com/office/powerpoint/2010/main" val="1496489604"/>
       </p:ext>
     </p:extLst>
   </p:cSld>
@@ -10161,10 +10295,10 @@
       </p:grpSpPr>
       <p:sp>
         <p:nvSpPr>
-          <p:cNvPr id="2" name="Title 1">
-            <a:extLst>
-              <a:ext uri="{FF2B5EF4-FFF2-40B4-BE49-F238E27FC236}">
-                <a16:creationId xmlns:a16="http://schemas.microsoft.com/office/drawing/2014/main" id="{265400B4-46CB-A148-A3D5-8213789EB5E1}"/>
+          <p:cNvPr id="4" name="Title 3">
+            <a:extLst>
+              <a:ext uri="{FF2B5EF4-FFF2-40B4-BE49-F238E27FC236}">
+                <a16:creationId xmlns:a16="http://schemas.microsoft.com/office/drawing/2014/main" id="{9D248A8A-4E63-3246-AA41-148582ABBA3B}"/>
               </a:ext>
             </a:extLst>
           </p:cNvPr>
@@ -10182,40 +10316,15 @@
           <a:p>
             <a:r>
               <a:rPr lang="en-US" dirty="0"/>
-              <a:t>Data</a:t>
-            </a:r>
-          </a:p>
-        </p:txBody>
-      </p:sp>
-      <p:sp>
-        <p:nvSpPr>
-          <p:cNvPr id="3" name="Content Placeholder 2">
-            <a:extLst>
-              <a:ext uri="{FF2B5EF4-FFF2-40B4-BE49-F238E27FC236}">
-                <a16:creationId xmlns:a16="http://schemas.microsoft.com/office/drawing/2014/main" id="{7106DB91-5A18-1745-881A-B20A19331243}"/>
-              </a:ext>
-            </a:extLst>
-          </p:cNvPr>
-          <p:cNvSpPr>
-            <a:spLocks noGrp="1"/>
-          </p:cNvSpPr>
-          <p:nvPr>
-            <p:ph idx="1"/>
-          </p:nvPr>
-        </p:nvSpPr>
-        <p:spPr/>
-        <p:txBody>
-          <a:bodyPr/>
-          <a:lstStyle/>
-          <a:p>
-            <a:endParaRPr lang="en-US"/>
+              <a:t>Developer Profile</a:t>
+            </a:r>
           </a:p>
         </p:txBody>
       </p:sp>
     </p:spTree>
     <p:extLst>
       <p:ext uri="{BB962C8B-B14F-4D97-AF65-F5344CB8AC3E}">
-        <p14:creationId xmlns:p14="http://schemas.microsoft.com/office/powerpoint/2010/main" val="3560031451"/>
+        <p14:creationId xmlns:p14="http://schemas.microsoft.com/office/powerpoint/2010/main" val="250931104"/>
       </p:ext>
     </p:extLst>
   </p:cSld>
@@ -10244,10 +10353,10 @@
       </p:grpSpPr>
       <p:sp>
         <p:nvSpPr>
-          <p:cNvPr id="4" name="Title 3">
-            <a:extLst>
-              <a:ext uri="{FF2B5EF4-FFF2-40B4-BE49-F238E27FC236}">
-                <a16:creationId xmlns:a16="http://schemas.microsoft.com/office/drawing/2014/main" id="{9D248A8A-4E63-3246-AA41-148582ABBA3B}"/>
+          <p:cNvPr id="3" name="Title 2">
+            <a:extLst>
+              <a:ext uri="{FF2B5EF4-FFF2-40B4-BE49-F238E27FC236}">
+                <a16:creationId xmlns:a16="http://schemas.microsoft.com/office/drawing/2014/main" id="{EC4C3BC2-C734-E14A-8A42-1A0A834639EA}"/>
               </a:ext>
             </a:extLst>
           </p:cNvPr>
@@ -10265,15 +10374,44 @@
           <a:p>
             <a:r>
               <a:rPr lang="en-US" dirty="0"/>
-              <a:t>Developer Profile</a:t>
-            </a:r>
-          </a:p>
-        </p:txBody>
-      </p:sp>
+              <a:t>Geography</a:t>
+            </a:r>
+          </a:p>
+        </p:txBody>
+      </p:sp>
+      <p:pic>
+        <p:nvPicPr>
+          <p:cNvPr id="6" name="Content Placeholder 5">
+            <a:extLst>
+              <a:ext uri="{FF2B5EF4-FFF2-40B4-BE49-F238E27FC236}">
+                <a16:creationId xmlns:a16="http://schemas.microsoft.com/office/drawing/2014/main" id="{85AF150A-A5CF-A048-A3F1-F8C0F1DB02CA}"/>
+              </a:ext>
+            </a:extLst>
+          </p:cNvPr>
+          <p:cNvPicPr>
+            <a:picLocks noGrp="1" noChangeAspect="1"/>
+          </p:cNvPicPr>
+          <p:nvPr>
+            <p:ph idx="1"/>
+          </p:nvPr>
+        </p:nvPicPr>
+        <p:blipFill>
+          <a:blip r:embed="rId2"/>
+          <a:stretch>
+            <a:fillRect/>
+          </a:stretch>
+        </p:blipFill>
+        <p:spPr>
+          <a:xfrm>
+            <a:off x="1720477" y="1048871"/>
+            <a:ext cx="8751046" cy="5848913"/>
+          </a:xfrm>
+        </p:spPr>
+      </p:pic>
     </p:spTree>
     <p:extLst>
       <p:ext uri="{BB962C8B-B14F-4D97-AF65-F5344CB8AC3E}">
-        <p14:creationId xmlns:p14="http://schemas.microsoft.com/office/powerpoint/2010/main" val="250931104"/>
+        <p14:creationId xmlns:p14="http://schemas.microsoft.com/office/powerpoint/2010/main" val="2423137877"/>
       </p:ext>
     </p:extLst>
   </p:cSld>
@@ -10302,10 +10440,10 @@
       </p:grpSpPr>
       <p:sp>
         <p:nvSpPr>
-          <p:cNvPr id="3" name="Title 2">
-            <a:extLst>
-              <a:ext uri="{FF2B5EF4-FFF2-40B4-BE49-F238E27FC236}">
-                <a16:creationId xmlns:a16="http://schemas.microsoft.com/office/drawing/2014/main" id="{EC4C3BC2-C734-E14A-8A42-1A0A834639EA}"/>
+          <p:cNvPr id="2" name="Title 1">
+            <a:extLst>
+              <a:ext uri="{FF2B5EF4-FFF2-40B4-BE49-F238E27FC236}">
+                <a16:creationId xmlns:a16="http://schemas.microsoft.com/office/drawing/2014/main" id="{148D1DF6-1C1F-0A49-8DFF-1CFD9031BCB6}"/>
               </a:ext>
             </a:extLst>
           </p:cNvPr>
@@ -10323,17 +10461,17 @@
           <a:p>
             <a:r>
               <a:rPr lang="en-US" dirty="0"/>
-              <a:t>Geography</a:t>
+              <a:t>Developer Roles</a:t>
             </a:r>
           </a:p>
         </p:txBody>
       </p:sp>
       <p:pic>
         <p:nvPicPr>
-          <p:cNvPr id="6" name="Content Placeholder 5">
-            <a:extLst>
-              <a:ext uri="{FF2B5EF4-FFF2-40B4-BE49-F238E27FC236}">
-                <a16:creationId xmlns:a16="http://schemas.microsoft.com/office/drawing/2014/main" id="{85AF150A-A5CF-A048-A3F1-F8C0F1DB02CA}"/>
+          <p:cNvPr id="5" name="Content Placeholder 4">
+            <a:extLst>
+              <a:ext uri="{FF2B5EF4-FFF2-40B4-BE49-F238E27FC236}">
+                <a16:creationId xmlns:a16="http://schemas.microsoft.com/office/drawing/2014/main" id="{0026115F-D365-0342-853A-81DD3E514840}"/>
               </a:ext>
             </a:extLst>
           </p:cNvPr>
@@ -10352,15 +10490,15 @@
         </p:blipFill>
         <p:spPr>
           <a:xfrm>
-            <a:off x="1720477" y="1048871"/>
-            <a:ext cx="8751046" cy="5848913"/>
+            <a:off x="2209264" y="1048871"/>
+            <a:ext cx="7773472" cy="5307012"/>
           </a:xfrm>
         </p:spPr>
       </p:pic>
     </p:spTree>
     <p:extLst>
       <p:ext uri="{BB962C8B-B14F-4D97-AF65-F5344CB8AC3E}">
-        <p14:creationId xmlns:p14="http://schemas.microsoft.com/office/powerpoint/2010/main" val="2423137877"/>
+        <p14:creationId xmlns:p14="http://schemas.microsoft.com/office/powerpoint/2010/main" val="2785525551"/>
       </p:ext>
     </p:extLst>
   </p:cSld>

</xml_diff>

<commit_message>
Added scatter plot for Salary and Experience by Language.
</commit_message>
<xml_diff>
--- a/Stack-overflow-2018-data-analysis.pptx
+++ b/Stack-overflow-2018-data-analysis.pptx
@@ -3777,7 +3777,7 @@
           <a:p>
             <a:fld id="{3D296FA4-8D31-E24A-89D9-4C3094BA17DE}" type="datetimeFigureOut">
               <a:rPr lang="en-US" smtClean="0"/>
-              <a:t>8/11/18</a:t>
+              <a:t>8/12/18</a:t>
             </a:fld>
             <a:endParaRPr lang="en-US"/>
           </a:p>
@@ -4359,7 +4359,7 @@
           <a:p>
             <a:fld id="{0C559D6A-A013-ED42-812C-F1F804FF282B}" type="datetimeFigureOut">
               <a:rPr lang="en-US" smtClean="0"/>
-              <a:t>8/11/18</a:t>
+              <a:t>8/12/18</a:t>
             </a:fld>
             <a:endParaRPr lang="en-US"/>
           </a:p>
@@ -4557,7 +4557,7 @@
           <a:p>
             <a:fld id="{0C559D6A-A013-ED42-812C-F1F804FF282B}" type="datetimeFigureOut">
               <a:rPr lang="en-US" smtClean="0"/>
-              <a:t>8/11/18</a:t>
+              <a:t>8/12/18</a:t>
             </a:fld>
             <a:endParaRPr lang="en-US"/>
           </a:p>
@@ -4765,7 +4765,7 @@
           <a:p>
             <a:fld id="{0C559D6A-A013-ED42-812C-F1F804FF282B}" type="datetimeFigureOut">
               <a:rPr lang="en-US" smtClean="0"/>
-              <a:t>8/11/18</a:t>
+              <a:t>8/12/18</a:t>
             </a:fld>
             <a:endParaRPr lang="en-US"/>
           </a:p>
@@ -4981,7 +4981,7 @@
           <a:p>
             <a:fld id="{0C559D6A-A013-ED42-812C-F1F804FF282B}" type="datetimeFigureOut">
               <a:rPr lang="en-US" smtClean="0"/>
-              <a:t>8/11/18</a:t>
+              <a:t>8/12/18</a:t>
             </a:fld>
             <a:endParaRPr lang="en-US"/>
           </a:p>
@@ -5135,7 +5135,7 @@
           <a:p>
             <a:fld id="{0C559D6A-A013-ED42-812C-F1F804FF282B}" type="datetimeFigureOut">
               <a:rPr lang="en-US" smtClean="0"/>
-              <a:t>8/11/18</a:t>
+              <a:t>8/12/18</a:t>
             </a:fld>
             <a:endParaRPr lang="en-US"/>
           </a:p>
@@ -5400,7 +5400,7 @@
           <a:p>
             <a:fld id="{0C559D6A-A013-ED42-812C-F1F804FF282B}" type="datetimeFigureOut">
               <a:rPr lang="en-US" smtClean="0"/>
-              <a:t>8/11/18</a:t>
+              <a:t>8/12/18</a:t>
             </a:fld>
             <a:endParaRPr lang="en-US"/>
           </a:p>
@@ -5812,7 +5812,7 @@
           <a:p>
             <a:fld id="{0C559D6A-A013-ED42-812C-F1F804FF282B}" type="datetimeFigureOut">
               <a:rPr lang="en-US" smtClean="0"/>
-              <a:t>8/11/18</a:t>
+              <a:t>8/12/18</a:t>
             </a:fld>
             <a:endParaRPr lang="en-US"/>
           </a:p>
@@ -5953,7 +5953,7 @@
           <a:p>
             <a:fld id="{0C559D6A-A013-ED42-812C-F1F804FF282B}" type="datetimeFigureOut">
               <a:rPr lang="en-US" smtClean="0"/>
-              <a:t>8/11/18</a:t>
+              <a:t>8/12/18</a:t>
             </a:fld>
             <a:endParaRPr lang="en-US"/>
           </a:p>
@@ -6066,7 +6066,7 @@
           <a:p>
             <a:fld id="{0C559D6A-A013-ED42-812C-F1F804FF282B}" type="datetimeFigureOut">
               <a:rPr lang="en-US" smtClean="0"/>
-              <a:t>8/11/18</a:t>
+              <a:t>8/12/18</a:t>
             </a:fld>
             <a:endParaRPr lang="en-US"/>
           </a:p>
@@ -6377,7 +6377,7 @@
           <a:p>
             <a:fld id="{0C559D6A-A013-ED42-812C-F1F804FF282B}" type="datetimeFigureOut">
               <a:rPr lang="en-US" smtClean="0"/>
-              <a:t>8/11/18</a:t>
+              <a:t>8/12/18</a:t>
             </a:fld>
             <a:endParaRPr lang="en-US"/>
           </a:p>
@@ -6665,7 +6665,7 @@
           <a:p>
             <a:fld id="{0C559D6A-A013-ED42-812C-F1F804FF282B}" type="datetimeFigureOut">
               <a:rPr lang="en-US" smtClean="0"/>
-              <a:t>8/11/18</a:t>
+              <a:t>8/12/18</a:t>
             </a:fld>
             <a:endParaRPr lang="en-US"/>
           </a:p>
@@ -6906,7 +6906,7 @@
           <a:p>
             <a:fld id="{0C559D6A-A013-ED42-812C-F1F804FF282B}" type="datetimeFigureOut">
               <a:rPr lang="en-US" smtClean="0"/>
-              <a:t>8/11/18</a:t>
+              <a:t>8/12/18</a:t>
             </a:fld>
             <a:endParaRPr lang="en-US"/>
           </a:p>
@@ -9650,7 +9650,7 @@
         <p:spPr>
           <a:xfrm>
             <a:off x="838200" y="22225"/>
-            <a:ext cx="10515600" cy="1325563"/>
+            <a:ext cx="10948988" cy="1325563"/>
           </a:xfrm>
         </p:spPr>
         <p:txBody>
@@ -9659,17 +9659,17 @@
           <a:p>
             <a:r>
               <a:rPr lang="en-US" dirty="0"/>
-              <a:t>Top 10 Language by Salary (US)</a:t>
+              <a:t>Salary and Experience by Language: Global</a:t>
             </a:r>
           </a:p>
         </p:txBody>
       </p:sp>
       <p:pic>
         <p:nvPicPr>
-          <p:cNvPr id="7" name="Content Placeholder 6">
-            <a:extLst>
-              <a:ext uri="{FF2B5EF4-FFF2-40B4-BE49-F238E27FC236}">
-                <a16:creationId xmlns:a16="http://schemas.microsoft.com/office/drawing/2014/main" id="{06E5EEA5-E3FC-7A4D-BC95-1733705175A3}"/>
+          <p:cNvPr id="6" name="Content Placeholder 5">
+            <a:extLst>
+              <a:ext uri="{FF2B5EF4-FFF2-40B4-BE49-F238E27FC236}">
+                <a16:creationId xmlns:a16="http://schemas.microsoft.com/office/drawing/2014/main" id="{CE7BE351-D904-B640-B5F7-57408F49ACCE}"/>
               </a:ext>
             </a:extLst>
           </p:cNvPr>
@@ -9688,8 +9688,8 @@
         </p:blipFill>
         <p:spPr>
           <a:xfrm>
-            <a:off x="838200" y="1823216"/>
-            <a:ext cx="10515600" cy="3759255"/>
+            <a:off x="838200" y="1067806"/>
+            <a:ext cx="10515600" cy="5270075"/>
           </a:xfrm>
         </p:spPr>
       </p:pic>

</xml_diff>